<commit_message>
New clase 6 2
</commit_message>
<xml_diff>
--- a/clase6/teoria/clase6.pptx
+++ b/clase6/teoria/clase6.pptx
@@ -32385,7 +32385,7 @@
 </file>
 
 <file path=ppt/slides/slide51.xml><?xml version="1.0" encoding="utf-8"?>
-<p:sld xmlns:a="http://schemas.openxmlformats.org/drawingml/2006/main" xmlns:r="http://schemas.openxmlformats.org/officeDocument/2006/relationships" xmlns:p="http://schemas.openxmlformats.org/presentationml/2006/main">
+<p:sld xmlns:a="http://schemas.openxmlformats.org/drawingml/2006/main" xmlns:r="http://schemas.openxmlformats.org/officeDocument/2006/relationships" xmlns:p="http://schemas.openxmlformats.org/presentationml/2006/main" show="0">
   <p:cSld>
     <p:bg>
       <p:bgPr>
@@ -32783,7 +32783,7 @@
 </file>
 
 <file path=ppt/slides/slide52.xml><?xml version="1.0" encoding="utf-8"?>
-<p:sld xmlns:a="http://schemas.openxmlformats.org/drawingml/2006/main" xmlns:r="http://schemas.openxmlformats.org/officeDocument/2006/relationships" xmlns:p="http://schemas.openxmlformats.org/presentationml/2006/main">
+<p:sld xmlns:a="http://schemas.openxmlformats.org/drawingml/2006/main" xmlns:r="http://schemas.openxmlformats.org/officeDocument/2006/relationships" xmlns:p="http://schemas.openxmlformats.org/presentationml/2006/main" show="0">
   <p:cSld>
     <p:spTree>
       <p:nvGrpSpPr>

</xml_diff>